<commit_message>
Updated Carnot Stack Doc
</commit_message>
<xml_diff>
--- a/The Carnot Stack.pptx
+++ b/The Carnot Stack.pptx
@@ -3103,7 +3103,7 @@
         </p:nvSpPr>
         <p:spPr>
           <a:xfrm>
-            <a:off x="432940" y="4588836"/>
+            <a:off x="433062" y="4617697"/>
             <a:ext cx="1775042" cy="793666"/>
           </a:xfrm>
           <a:prstGeom prst="rect">
@@ -3164,8 +3164,8 @@
         </p:nvSpPr>
         <p:spPr>
           <a:xfrm>
-            <a:off x="2207982" y="4588836"/>
-            <a:ext cx="1962648" cy="793666"/>
+            <a:off x="2511036" y="4617697"/>
+            <a:ext cx="1659715" cy="793666"/>
           </a:xfrm>
           <a:prstGeom prst="rect">
             <a:avLst/>
@@ -3217,7 +3217,7 @@
         </p:nvSpPr>
         <p:spPr>
           <a:xfrm>
-            <a:off x="432940" y="3795170"/>
+            <a:off x="433062" y="3824031"/>
             <a:ext cx="1775042" cy="793666"/>
           </a:xfrm>
           <a:prstGeom prst="rect">
@@ -3283,8 +3283,8 @@
         </p:nvSpPr>
         <p:spPr>
           <a:xfrm>
-            <a:off x="2207982" y="3795170"/>
-            <a:ext cx="1962648" cy="793666"/>
+            <a:off x="2511036" y="3824031"/>
+            <a:ext cx="1659716" cy="793666"/>
           </a:xfrm>
           <a:prstGeom prst="rect">
             <a:avLst/>
@@ -3333,7 +3333,7 @@
         </p:nvSpPr>
         <p:spPr>
           <a:xfrm>
-            <a:off x="432939" y="2583024"/>
+            <a:off x="433061" y="2611885"/>
             <a:ext cx="5657046" cy="1212146"/>
           </a:xfrm>
           <a:prstGeom prst="rect">
@@ -3452,7 +3452,7 @@
         </p:nvGrpSpPr>
         <p:grpSpPr>
           <a:xfrm>
-            <a:off x="6256820" y="3787072"/>
+            <a:off x="6256942" y="3815933"/>
             <a:ext cx="2380281" cy="1595430"/>
             <a:chOff x="4424052" y="3953902"/>
             <a:chExt cx="1775042" cy="1595430"/>
@@ -3633,7 +3633,7 @@
         </p:nvSpPr>
         <p:spPr>
           <a:xfrm>
-            <a:off x="432939" y="1861508"/>
+            <a:off x="433061" y="1890369"/>
             <a:ext cx="5657043" cy="721515"/>
           </a:xfrm>
           <a:prstGeom prst="rect">
@@ -3686,17 +3686,14 @@
         </p:nvSpPr>
         <p:spPr>
           <a:xfrm>
-            <a:off x="6753826" y="1993846"/>
-            <a:ext cx="1775042" cy="456840"/>
+            <a:off x="1493879" y="5607404"/>
+            <a:ext cx="1775042" cy="1108668"/>
           </a:xfrm>
           <a:prstGeom prst="rect">
             <a:avLst/>
           </a:prstGeom>
           <a:solidFill>
-            <a:schemeClr val="accent4">
-              <a:lumMod val="40000"/>
-              <a:lumOff val="60000"/>
-            </a:schemeClr>
+            <a:srgbClr val="CCFFCC"/>
           </a:solidFill>
         </p:spPr>
         <p:style>
@@ -3724,6 +3721,17 @@
                   <a:schemeClr val="tx1"/>
                 </a:solidFill>
               </a:rPr>
+              <a:t>Native</a:t>
+            </a:r>
+          </a:p>
+          <a:p>
+            <a:pPr algn="ctr"/>
+            <a:r>
+              <a:rPr lang="en-US" dirty="0" smtClean="0">
+                <a:solidFill>
+                  <a:schemeClr val="tx1"/>
+                </a:solidFill>
+              </a:rPr>
               <a:t>External DBs</a:t>
             </a:r>
             <a:endParaRPr lang="en-US" dirty="0">
@@ -3742,7 +3750,7 @@
         </p:nvSpPr>
         <p:spPr>
           <a:xfrm>
-            <a:off x="4141765" y="1047078"/>
+            <a:off x="4141887" y="1075939"/>
             <a:ext cx="1948217" cy="793666"/>
           </a:xfrm>
           <a:prstGeom prst="rect">
@@ -3795,7 +3803,7 @@
         </p:nvSpPr>
         <p:spPr>
           <a:xfrm>
-            <a:off x="6753826" y="5847389"/>
+            <a:off x="6753948" y="5876250"/>
             <a:ext cx="1183362" cy="698510"/>
           </a:xfrm>
           <a:prstGeom prst="ellipse">
@@ -3847,7 +3855,7 @@
         </p:nvCxnSpPr>
         <p:spPr>
           <a:xfrm flipH="1" flipV="1">
-            <a:off x="7403231" y="4422888"/>
+            <a:off x="7403353" y="4451749"/>
             <a:ext cx="360658" cy="1526795"/>
           </a:xfrm>
           <a:prstGeom prst="straightConnector1">
@@ -3881,7 +3889,7 @@
         </p:nvSpPr>
         <p:spPr>
           <a:xfrm>
-            <a:off x="4170631" y="3803266"/>
+            <a:off x="4170753" y="3832127"/>
             <a:ext cx="1919353" cy="1305059"/>
           </a:xfrm>
           <a:prstGeom prst="rect">
@@ -3988,7 +3996,7 @@
         </p:nvSpPr>
         <p:spPr>
           <a:xfrm>
-            <a:off x="4170630" y="5108326"/>
+            <a:off x="4170752" y="5137187"/>
             <a:ext cx="1919353" cy="1437573"/>
           </a:xfrm>
           <a:prstGeom prst="rect">
@@ -4098,7 +4106,7 @@
         </p:nvSpPr>
         <p:spPr>
           <a:xfrm>
-            <a:off x="433061" y="2583024"/>
+            <a:off x="433183" y="2611885"/>
             <a:ext cx="5656922" cy="369332"/>
           </a:xfrm>
           <a:prstGeom prst="rect">
@@ -4136,7 +4144,7 @@
         </p:nvCxnSpPr>
         <p:spPr>
           <a:xfrm flipH="1" flipV="1">
-            <a:off x="2381278" y="3492133"/>
+            <a:off x="2381400" y="3520994"/>
             <a:ext cx="4545847" cy="2457550"/>
           </a:xfrm>
           <a:prstGeom prst="straightConnector1">
@@ -4166,15 +4174,14 @@
         <p:nvCxnSpPr>
           <p:cNvPr id="47" name="Straight Arrow Connector 46"/>
           <p:cNvCxnSpPr>
-            <a:stCxn id="20" idx="3"/>
-            <a:endCxn id="25" idx="1"/>
+            <a:endCxn id="25" idx="0"/>
           </p:cNvCxnSpPr>
           <p:nvPr/>
         </p:nvCxnSpPr>
         <p:spPr>
-          <a:xfrm>
-            <a:off x="6089982" y="2222266"/>
-            <a:ext cx="663844" cy="0"/>
+          <a:xfrm flipH="1">
+            <a:off x="2381400" y="3832128"/>
+            <a:ext cx="1" cy="1775276"/>
           </a:xfrm>
           <a:prstGeom prst="straightConnector1">
             <a:avLst/>
@@ -4207,8 +4214,8 @@
         </p:nvSpPr>
         <p:spPr>
           <a:xfrm>
-            <a:off x="0" y="274176"/>
-            <a:ext cx="9144000" cy="461665"/>
+            <a:off x="0" y="28861"/>
+            <a:ext cx="9144000" cy="830997"/>
           </a:xfrm>
           <a:prstGeom prst="rect">
             <a:avLst/>
@@ -4226,6 +4233,13 @@
               <a:rPr lang="en-US" sz="2400" dirty="0" smtClean="0"/>
               <a:t>Carnot Technology Stack</a:t>
             </a:r>
+          </a:p>
+          <a:p>
+            <a:pPr algn="ctr"/>
+            <a:r>
+              <a:rPr lang="en-US" sz="2400" dirty="0" smtClean="0"/>
+              <a:t>(January 2016)</a:t>
+            </a:r>
             <a:endParaRPr lang="en-US" sz="2400" dirty="0"/>
           </a:p>
         </p:txBody>
@@ -4238,7 +4252,7 @@
         </p:nvSpPr>
         <p:spPr>
           <a:xfrm>
-            <a:off x="1024619" y="3029003"/>
+            <a:off x="1024741" y="3057864"/>
             <a:ext cx="2150256" cy="600218"/>
           </a:xfrm>
           <a:prstGeom prst="rect">
@@ -4277,7 +4291,7 @@
         </p:nvCxnSpPr>
         <p:spPr>
           <a:xfrm flipH="1">
-            <a:off x="4170630" y="3145805"/>
+            <a:off x="4170752" y="3174666"/>
             <a:ext cx="1" cy="657462"/>
           </a:xfrm>
           <a:prstGeom prst="line">
@@ -4307,7 +4321,7 @@
         </p:nvSpPr>
         <p:spPr>
           <a:xfrm>
-            <a:off x="1674025" y="1047078"/>
+            <a:off x="1674147" y="1075939"/>
             <a:ext cx="1082344" cy="793666"/>
           </a:xfrm>
           <a:prstGeom prst="rect">
@@ -4342,7 +4356,7 @@
                   <a:srgbClr val="000000"/>
                 </a:solidFill>
               </a:rPr>
-              <a:t>R</a:t>
+              <a:t>Oracle Apex</a:t>
             </a:r>
             <a:endParaRPr lang="en-US" dirty="0">
               <a:solidFill>
@@ -4360,7 +4374,7 @@
         </p:nvSpPr>
         <p:spPr>
           <a:xfrm>
-            <a:off x="433061" y="1047078"/>
+            <a:off x="433183" y="1075939"/>
             <a:ext cx="1240963" cy="793666"/>
           </a:xfrm>
           <a:prstGeom prst="rect">
@@ -4395,7 +4409,7 @@
                   <a:srgbClr val="000000"/>
                 </a:solidFill>
               </a:rPr>
-              <a:t>Oracle Apex</a:t>
+              <a:t>R</a:t>
             </a:r>
             <a:endParaRPr lang="en-US" dirty="0">
               <a:solidFill>
@@ -4413,7 +4427,7 @@
         </p:nvSpPr>
         <p:spPr>
           <a:xfrm>
-            <a:off x="6089982" y="2570355"/>
+            <a:off x="6090104" y="2599216"/>
             <a:ext cx="2547119" cy="1224815"/>
           </a:xfrm>
           <a:prstGeom prst="rect">
@@ -4480,6 +4494,16 @@
               </a:rPr>
               <a:t>CarnotKE</a:t>
             </a:r>
+            <a:r>
+              <a:rPr lang="en-US" dirty="0" smtClean="0">
+                <a:solidFill>
+                  <a:schemeClr val="bg1">
+                    <a:lumMod val="75000"/>
+                  </a:schemeClr>
+                </a:solidFill>
+              </a:rPr>
+              <a:t> plus work on Schema Optional SIM</a:t>
+            </a:r>
             <a:endParaRPr lang="en-US" dirty="0">
               <a:solidFill>
                 <a:schemeClr val="bg1">
@@ -4498,7 +4522,7 @@
         </p:nvSpPr>
         <p:spPr>
           <a:xfrm>
-            <a:off x="2756369" y="1047078"/>
+            <a:off x="2756491" y="1075939"/>
             <a:ext cx="1385396" cy="793666"/>
           </a:xfrm>
           <a:prstGeom prst="rect">
@@ -4542,6 +4566,59 @@
                 </a:solidFill>
               </a:rPr>
               <a:t> applications</a:t>
+            </a:r>
+            <a:endParaRPr lang="en-US" dirty="0">
+              <a:solidFill>
+                <a:srgbClr val="000000"/>
+              </a:solidFill>
+            </a:endParaRPr>
+          </a:p>
+        </p:txBody>
+      </p:sp>
+      <p:sp>
+        <p:nvSpPr>
+          <p:cNvPr id="91" name="Rectangle 90"/>
+          <p:cNvSpPr/>
+          <p:nvPr/>
+        </p:nvSpPr>
+        <p:spPr>
+          <a:xfrm>
+            <a:off x="433184" y="255175"/>
+            <a:ext cx="1240963" cy="793666"/>
+          </a:xfrm>
+          <a:prstGeom prst="rect">
+            <a:avLst/>
+          </a:prstGeom>
+          <a:solidFill>
+            <a:schemeClr val="accent5"/>
+          </a:solidFill>
+        </p:spPr>
+        <p:style>
+          <a:lnRef idx="1">
+            <a:schemeClr val="accent1"/>
+          </a:lnRef>
+          <a:fillRef idx="3">
+            <a:schemeClr val="accent1"/>
+          </a:fillRef>
+          <a:effectRef idx="2">
+            <a:schemeClr val="accent1"/>
+          </a:effectRef>
+          <a:fontRef idx="minor">
+            <a:schemeClr val="lt1"/>
+          </a:fontRef>
+        </p:style>
+        <p:txBody>
+          <a:bodyPr rtlCol="0" anchor="ctr"/>
+          <a:lstStyle/>
+          <a:p>
+            <a:pPr algn="ctr"/>
+            <a:r>
+              <a:rPr lang="en-US" dirty="0" smtClean="0">
+                <a:solidFill>
+                  <a:srgbClr val="000000"/>
+                </a:solidFill>
+              </a:rPr>
+              <a:t>Tableau</a:t>
             </a:r>
             <a:endParaRPr lang="en-US" dirty="0">
               <a:solidFill>

</xml_diff>

<commit_message>
Updated to February Version
</commit_message>
<xml_diff>
--- a/The Carnot Stack.pptx
+++ b/The Carnot Stack.pptx
@@ -3333,8 +3333,8 @@
         </p:nvSpPr>
         <p:spPr>
           <a:xfrm>
-            <a:off x="433061" y="2611885"/>
-            <a:ext cx="5657046" cy="1212146"/>
+            <a:off x="433060" y="2611885"/>
+            <a:ext cx="7662871" cy="1212146"/>
           </a:xfrm>
           <a:prstGeom prst="rect">
             <a:avLst/>
@@ -3361,14 +3361,148 @@
           <a:bodyPr rtlCol="0" anchor="ctr"/>
           <a:lstStyle/>
           <a:p>
-            <a:pPr algn="ctr"/>
             <a:r>
               <a:rPr lang="en-US" dirty="0" smtClean="0">
                 <a:solidFill>
+                  <a:srgbClr val="FF0000"/>
+                </a:solidFill>
+              </a:rPr>
+              <a:t>SQL</a:t>
+            </a:r>
+            <a:r>
+              <a:rPr lang="en-US" dirty="0" smtClean="0">
+                <a:solidFill>
                   <a:schemeClr val="tx1"/>
+                </a:solidFill>
+              </a:rPr>
+              <a:t>   Neo4j  </a:t>
+            </a:r>
+            <a:r>
+              <a:rPr lang="en-US" dirty="0" smtClean="0">
+                <a:solidFill>
+                  <a:srgbClr val="FF0000"/>
+                </a:solidFill>
+              </a:rPr>
+              <a:t>Gremlin</a:t>
+            </a:r>
+            <a:r>
+              <a:rPr lang="en-US" dirty="0" smtClean="0">
+                <a:solidFill>
+                  <a:srgbClr val="7F7F7F"/>
+                </a:solidFill>
+              </a:rPr>
+              <a:t> Others</a:t>
+            </a:r>
+            <a:r>
+              <a:rPr lang="en-US" dirty="0" smtClean="0">
+                <a:solidFill>
+                  <a:schemeClr val="tx1"/>
+                </a:solidFill>
+              </a:rPr>
+              <a:t>   SPARQL        </a:t>
+            </a:r>
+            <a:r>
+              <a:rPr lang="en-US" dirty="0" smtClean="0">
+                <a:solidFill>
+                  <a:srgbClr val="7F7F7F"/>
+                </a:solidFill>
+              </a:rPr>
+              <a:t>Other Languages                      </a:t>
+            </a:r>
+            <a:r>
+              <a:rPr lang="en-US" dirty="0" smtClean="0">
+                <a:solidFill>
+                  <a:srgbClr val="FF0000"/>
+                </a:solidFill>
+              </a:rPr>
+              <a:t>SIM</a:t>
+            </a:r>
+          </a:p>
+          <a:p>
+            <a:r>
+              <a:rPr lang="en-US" dirty="0">
+                <a:solidFill>
+                  <a:srgbClr val="7F7F7F"/>
                 </a:solidFill>
               </a:rPr>
               <a:t> </a:t>
+            </a:r>
+            <a:r>
+              <a:rPr lang="en-US" dirty="0" smtClean="0">
+                <a:solidFill>
+                  <a:srgbClr val="7F7F7F"/>
+                </a:solidFill>
+              </a:rPr>
+              <a:t>                           </a:t>
+            </a:r>
+            <a:r>
+              <a:rPr lang="en-US" dirty="0" smtClean="0">
+                <a:solidFill>
+                  <a:srgbClr val="FF0000"/>
+                </a:solidFill>
+              </a:rPr>
+              <a:t>SIM</a:t>
+            </a:r>
+            <a:endParaRPr lang="en-US" dirty="0">
+              <a:solidFill>
+                <a:srgbClr val="FF0000"/>
+              </a:solidFill>
+            </a:endParaRPr>
+          </a:p>
+        </p:txBody>
+      </p:sp>
+      <p:sp>
+        <p:nvSpPr>
+          <p:cNvPr id="13" name="Rectangle 12"/>
+          <p:cNvSpPr/>
+          <p:nvPr/>
+        </p:nvSpPr>
+        <p:spPr>
+          <a:xfrm>
+            <a:off x="6098316" y="3840227"/>
+            <a:ext cx="1997615" cy="793666"/>
+          </a:xfrm>
+          <a:prstGeom prst="rect">
+            <a:avLst/>
+          </a:prstGeom>
+          <a:solidFill>
+            <a:srgbClr val="CCFFCC"/>
+          </a:solidFill>
+        </p:spPr>
+        <p:style>
+          <a:lnRef idx="1">
+            <a:schemeClr val="accent1"/>
+          </a:lnRef>
+          <a:fillRef idx="3">
+            <a:schemeClr val="accent1"/>
+          </a:fillRef>
+          <a:effectRef idx="2">
+            <a:schemeClr val="accent1"/>
+          </a:effectRef>
+          <a:fontRef idx="minor">
+            <a:schemeClr val="lt1"/>
+          </a:fontRef>
+        </p:style>
+        <p:txBody>
+          <a:bodyPr rtlCol="0" anchor="ctr"/>
+          <a:lstStyle/>
+          <a:p>
+            <a:pPr algn="ctr"/>
+            <a:r>
+              <a:rPr lang="en-US" dirty="0" smtClean="0">
+                <a:solidFill>
+                  <a:schemeClr val="tx1"/>
+                </a:solidFill>
+              </a:rPr>
+              <a:t>Oracle </a:t>
+            </a:r>
+            <a:r>
+              <a:rPr lang="en-US" dirty="0" err="1" smtClean="0">
+                <a:solidFill>
+                  <a:schemeClr val="tx1"/>
+                </a:solidFill>
+              </a:rPr>
+              <a:t>NoSQL</a:t>
             </a:r>
             <a:endParaRPr lang="en-US" dirty="0">
               <a:solidFill>
@@ -3384,57 +3518,7 @@
                   <a:schemeClr val="tx1"/>
                 </a:solidFill>
               </a:rPr>
-              <a:t>SQL   Neo4j  </a:t>
-            </a:r>
-            <a:r>
-              <a:rPr lang="en-US" dirty="0" smtClean="0">
-                <a:solidFill>
-                  <a:srgbClr val="7F7F7F"/>
-                </a:solidFill>
-              </a:rPr>
-              <a:t>Gremlin Others</a:t>
-            </a:r>
-            <a:r>
-              <a:rPr lang="en-US" dirty="0" smtClean="0">
-                <a:solidFill>
-                  <a:schemeClr val="tx1"/>
-                </a:solidFill>
-              </a:rPr>
-              <a:t>   SPARQL        </a:t>
-            </a:r>
-            <a:r>
-              <a:rPr lang="en-US" dirty="0" smtClean="0">
-                <a:solidFill>
-                  <a:srgbClr val="7F7F7F"/>
-                </a:solidFill>
-              </a:rPr>
-              <a:t>Other Languages</a:t>
-            </a:r>
-          </a:p>
-          <a:p>
-            <a:r>
-              <a:rPr lang="en-US" dirty="0">
-                <a:solidFill>
-                  <a:srgbClr val="7F7F7F"/>
-                </a:solidFill>
-              </a:rPr>
-              <a:t> </a:t>
-            </a:r>
-            <a:r>
-              <a:rPr lang="en-US" dirty="0" smtClean="0">
-                <a:solidFill>
-                  <a:srgbClr val="7F7F7F"/>
-                </a:solidFill>
-              </a:rPr>
-              <a:t>                           </a:t>
-            </a:r>
-            <a:r>
-              <a:rPr lang="en-US" dirty="0" smtClean="0">
-                <a:solidFill>
-                  <a:schemeClr val="tx1"/>
-                </a:solidFill>
-              </a:rPr>
-              <a:t>SIM</a:t>
+              <a:t>and/or Titan</a:t>
             </a:r>
             <a:endParaRPr lang="en-US" dirty="0">
               <a:solidFill>
@@ -3444,187 +3528,6 @@
           </a:p>
         </p:txBody>
       </p:sp>
-      <p:grpSp>
-        <p:nvGrpSpPr>
-          <p:cNvPr id="35" name="Group 34"/>
-          <p:cNvGrpSpPr/>
-          <p:nvPr/>
-        </p:nvGrpSpPr>
-        <p:grpSpPr>
-          <a:xfrm>
-            <a:off x="6256942" y="3815933"/>
-            <a:ext cx="2380281" cy="1595430"/>
-            <a:chOff x="4424052" y="3953902"/>
-            <a:chExt cx="1775042" cy="1595430"/>
-          </a:xfrm>
-        </p:grpSpPr>
-        <p:sp>
-          <p:nvSpPr>
-            <p:cNvPr id="13" name="Rectangle 12"/>
-            <p:cNvSpPr/>
-            <p:nvPr/>
-          </p:nvSpPr>
-          <p:spPr>
-            <a:xfrm>
-              <a:off x="4424052" y="4755666"/>
-              <a:ext cx="1775042" cy="793666"/>
-            </a:xfrm>
-            <a:prstGeom prst="rect">
-              <a:avLst/>
-            </a:prstGeom>
-            <a:solidFill>
-              <a:srgbClr val="CCFFCC"/>
-            </a:solidFill>
-          </p:spPr>
-          <p:style>
-            <a:lnRef idx="1">
-              <a:schemeClr val="accent1"/>
-            </a:lnRef>
-            <a:fillRef idx="3">
-              <a:schemeClr val="accent1"/>
-            </a:fillRef>
-            <a:effectRef idx="2">
-              <a:schemeClr val="accent1"/>
-            </a:effectRef>
-            <a:fontRef idx="minor">
-              <a:schemeClr val="lt1"/>
-            </a:fontRef>
-          </p:style>
-          <p:txBody>
-            <a:bodyPr rtlCol="0" anchor="ctr"/>
-            <a:lstStyle/>
-            <a:p>
-              <a:pPr algn="ctr"/>
-              <a:r>
-                <a:rPr lang="en-US" dirty="0" smtClean="0">
-                  <a:solidFill>
-                    <a:schemeClr val="tx1"/>
-                  </a:solidFill>
-                </a:rPr>
-                <a:t>Oracle </a:t>
-              </a:r>
-              <a:r>
-                <a:rPr lang="en-US" dirty="0" err="1" smtClean="0">
-                  <a:solidFill>
-                    <a:schemeClr val="tx1"/>
-                  </a:solidFill>
-                </a:rPr>
-                <a:t>NoSQL</a:t>
-              </a:r>
-              <a:endParaRPr lang="en-US" dirty="0">
-                <a:solidFill>
-                  <a:schemeClr val="tx1"/>
-                </a:solidFill>
-              </a:endParaRPr>
-            </a:p>
-            <a:p>
-              <a:pPr algn="ctr"/>
-              <a:r>
-                <a:rPr lang="en-US" dirty="0" smtClean="0">
-                  <a:solidFill>
-                    <a:schemeClr val="tx1"/>
-                  </a:solidFill>
-                </a:rPr>
-                <a:t>and Titan</a:t>
-              </a:r>
-              <a:endParaRPr lang="en-US" dirty="0">
-                <a:solidFill>
-                  <a:schemeClr val="tx1"/>
-                </a:solidFill>
-              </a:endParaRPr>
-            </a:p>
-          </p:txBody>
-        </p:sp>
-        <p:sp>
-          <p:nvSpPr>
-            <p:cNvPr id="18" name="Rectangle 17"/>
-            <p:cNvSpPr/>
-            <p:nvPr/>
-          </p:nvSpPr>
-          <p:spPr>
-            <a:xfrm>
-              <a:off x="4424052" y="3953902"/>
-              <a:ext cx="1775042" cy="801763"/>
-            </a:xfrm>
-            <a:prstGeom prst="rect">
-              <a:avLst/>
-            </a:prstGeom>
-          </p:spPr>
-          <p:style>
-            <a:lnRef idx="1">
-              <a:schemeClr val="accent1"/>
-            </a:lnRef>
-            <a:fillRef idx="3">
-              <a:schemeClr val="accent1"/>
-            </a:fillRef>
-            <a:effectRef idx="2">
-              <a:schemeClr val="accent1"/>
-            </a:effectRef>
-            <a:fontRef idx="minor">
-              <a:schemeClr val="lt1"/>
-            </a:fontRef>
-          </p:style>
-          <p:txBody>
-            <a:bodyPr rtlCol="0" anchor="ctr"/>
-            <a:lstStyle/>
-            <a:p>
-              <a:pPr algn="ctr">
-                <a:lnSpc>
-                  <a:spcPct val="80000"/>
-                </a:lnSpc>
-              </a:pPr>
-              <a:r>
-                <a:rPr lang="en-US" dirty="0" err="1" smtClean="0">
-                  <a:solidFill>
-                    <a:schemeClr val="tx1"/>
-                  </a:solidFill>
-                </a:rPr>
-                <a:t>CarnotDE</a:t>
-              </a:r>
-              <a:r>
-                <a:rPr lang="en-US" dirty="0" smtClean="0">
-                  <a:solidFill>
-                    <a:schemeClr val="tx1"/>
-                  </a:solidFill>
-                </a:rPr>
-                <a:t> (Data Engine)</a:t>
-              </a:r>
-            </a:p>
-            <a:p>
-              <a:pPr algn="ctr">
-                <a:lnSpc>
-                  <a:spcPct val="80000"/>
-                </a:lnSpc>
-              </a:pPr>
-              <a:endParaRPr lang="en-US" dirty="0">
-                <a:solidFill>
-                  <a:schemeClr val="tx1"/>
-                </a:solidFill>
-              </a:endParaRPr>
-            </a:p>
-            <a:p>
-              <a:pPr algn="ctr">
-                <a:lnSpc>
-                  <a:spcPct val="80000"/>
-                </a:lnSpc>
-              </a:pPr>
-              <a:r>
-                <a:rPr lang="en-US" dirty="0" smtClean="0">
-                  <a:solidFill>
-                    <a:schemeClr val="tx1"/>
-                  </a:solidFill>
-                </a:rPr>
-                <a:t>SIM</a:t>
-              </a:r>
-              <a:endParaRPr lang="en-US" dirty="0">
-                <a:solidFill>
-                  <a:schemeClr val="tx1"/>
-                </a:solidFill>
-              </a:endParaRPr>
-            </a:p>
-          </p:txBody>
-        </p:sp>
-      </p:grpSp>
       <p:sp>
         <p:nvSpPr>
           <p:cNvPr id="20" name="Rectangle 19"/>
@@ -3634,7 +3537,7 @@
         <p:spPr>
           <a:xfrm>
             <a:off x="433061" y="1890369"/>
-            <a:ext cx="5657043" cy="721515"/>
+            <a:ext cx="7662870" cy="721515"/>
           </a:xfrm>
           <a:prstGeom prst="rect">
             <a:avLst/>
@@ -3750,7 +3653,7 @@
         </p:nvSpPr>
         <p:spPr>
           <a:xfrm>
-            <a:off x="4141887" y="1075939"/>
+            <a:off x="5397412" y="1075393"/>
             <a:ext cx="1948217" cy="793666"/>
           </a:xfrm>
           <a:prstGeom prst="rect">
@@ -3849,14 +3752,14 @@
         <p:nvCxnSpPr>
           <p:cNvPr id="33" name="Straight Arrow Connector 32"/>
           <p:cNvCxnSpPr>
-            <a:stCxn id="27" idx="7"/>
+            <a:stCxn id="27" idx="0"/>
           </p:cNvCxnSpPr>
           <p:nvPr/>
         </p:nvCxnSpPr>
         <p:spPr>
           <a:xfrm flipH="1" flipV="1">
-            <a:off x="7403353" y="4451749"/>
-            <a:ext cx="360658" cy="1526795"/>
+            <a:off x="7244487" y="3174666"/>
+            <a:ext cx="101142" cy="2701584"/>
           </a:xfrm>
           <a:prstGeom prst="straightConnector1">
             <a:avLst/>
@@ -4144,8 +4047,8 @@
         </p:nvCxnSpPr>
         <p:spPr>
           <a:xfrm flipH="1" flipV="1">
-            <a:off x="2381400" y="3520994"/>
-            <a:ext cx="4545847" cy="2457550"/>
+            <a:off x="2381400" y="3419981"/>
+            <a:ext cx="4545847" cy="2558563"/>
           </a:xfrm>
           <a:prstGeom prst="straightConnector1">
             <a:avLst/>
@@ -4238,7 +4141,7 @@
             <a:pPr algn="ctr"/>
             <a:r>
               <a:rPr lang="en-US" sz="2400" dirty="0" smtClean="0"/>
-              <a:t>(January 2016)</a:t>
+              <a:t>(February2016)</a:t>
             </a:r>
             <a:endParaRPr lang="en-US" sz="2400" dirty="0"/>
           </a:p>
@@ -4252,7 +4155,7 @@
         </p:nvSpPr>
         <p:spPr>
           <a:xfrm>
-            <a:off x="1024741" y="3057864"/>
+            <a:off x="1010311" y="2974003"/>
             <a:ext cx="2150256" cy="600218"/>
           </a:xfrm>
           <a:prstGeom prst="rect">
@@ -4321,7 +4224,7 @@
         </p:nvSpPr>
         <p:spPr>
           <a:xfrm>
-            <a:off x="1674147" y="1075939"/>
+            <a:off x="2915110" y="1075939"/>
             <a:ext cx="1082344" cy="793666"/>
           </a:xfrm>
           <a:prstGeom prst="rect">
@@ -4421,108 +4324,13 @@
       </p:sp>
       <p:sp>
         <p:nvSpPr>
-          <p:cNvPr id="76" name="Rectangle 75"/>
-          <p:cNvSpPr/>
-          <p:nvPr/>
-        </p:nvSpPr>
-        <p:spPr>
-          <a:xfrm>
-            <a:off x="6090104" y="2599216"/>
-            <a:ext cx="2547119" cy="1224815"/>
-          </a:xfrm>
-          <a:prstGeom prst="rect">
-            <a:avLst/>
-          </a:prstGeom>
-          <a:noFill/>
-        </p:spPr>
-        <p:style>
-          <a:lnRef idx="1">
-            <a:schemeClr val="accent1"/>
-          </a:lnRef>
-          <a:fillRef idx="3">
-            <a:schemeClr val="accent1"/>
-          </a:fillRef>
-          <a:effectRef idx="2">
-            <a:schemeClr val="accent1"/>
-          </a:effectRef>
-          <a:fontRef idx="minor">
-            <a:schemeClr val="lt1"/>
-          </a:fontRef>
-        </p:style>
-        <p:txBody>
-          <a:bodyPr rtlCol="0" anchor="ctr"/>
-          <a:lstStyle/>
-          <a:p>
-            <a:pPr algn="ctr"/>
-            <a:r>
-              <a:rPr lang="en-US" dirty="0" smtClean="0">
-                <a:solidFill>
-                  <a:schemeClr val="bg1">
-                    <a:lumMod val="75000"/>
-                  </a:schemeClr>
-                </a:solidFill>
-              </a:rPr>
-              <a:t>Integrate </a:t>
-            </a:r>
-            <a:r>
-              <a:rPr lang="en-US" dirty="0" err="1" smtClean="0">
-                <a:solidFill>
-                  <a:schemeClr val="bg1">
-                    <a:lumMod val="75000"/>
-                  </a:schemeClr>
-                </a:solidFill>
-              </a:rPr>
-              <a:t>CarnotDE</a:t>
-            </a:r>
-            <a:r>
-              <a:rPr lang="en-US" dirty="0" smtClean="0">
-                <a:solidFill>
-                  <a:schemeClr val="bg1">
-                    <a:lumMod val="75000"/>
-                  </a:schemeClr>
-                </a:solidFill>
-              </a:rPr>
-              <a:t> into </a:t>
-            </a:r>
-            <a:r>
-              <a:rPr lang="en-US" dirty="0" err="1" smtClean="0">
-                <a:solidFill>
-                  <a:schemeClr val="bg1">
-                    <a:lumMod val="75000"/>
-                  </a:schemeClr>
-                </a:solidFill>
-              </a:rPr>
-              <a:t>CarnotKE</a:t>
-            </a:r>
-            <a:r>
-              <a:rPr lang="en-US" dirty="0" smtClean="0">
-                <a:solidFill>
-                  <a:schemeClr val="bg1">
-                    <a:lumMod val="75000"/>
-                  </a:schemeClr>
-                </a:solidFill>
-              </a:rPr>
-              <a:t> plus work on Schema Optional SIM</a:t>
-            </a:r>
-            <a:endParaRPr lang="en-US" dirty="0">
-              <a:solidFill>
-                <a:schemeClr val="bg1">
-                  <a:lumMod val="75000"/>
-                </a:schemeClr>
-              </a:solidFill>
-            </a:endParaRPr>
-          </a:p>
-        </p:txBody>
-      </p:sp>
-      <p:sp>
-        <p:nvSpPr>
           <p:cNvPr id="84" name="Rectangle 83"/>
           <p:cNvSpPr/>
           <p:nvPr/>
         </p:nvSpPr>
         <p:spPr>
           <a:xfrm>
-            <a:off x="2756491" y="1075939"/>
+            <a:off x="3997454" y="1075939"/>
             <a:ext cx="1385396" cy="793666"/>
           </a:xfrm>
           <a:prstGeom prst="rect">
@@ -4583,7 +4391,7 @@
         </p:nvSpPr>
         <p:spPr>
           <a:xfrm>
-            <a:off x="433184" y="255175"/>
+            <a:off x="1674147" y="1075939"/>
             <a:ext cx="1240963" cy="793666"/>
           </a:xfrm>
           <a:prstGeom prst="rect">
@@ -4592,6 +4400,11 @@
           <a:solidFill>
             <a:schemeClr val="accent5"/>
           </a:solidFill>
+          <a:ln>
+            <a:solidFill>
+              <a:srgbClr val="FF0000"/>
+            </a:solidFill>
+          </a:ln>
         </p:spPr>
         <p:style>
           <a:lnRef idx="1">
@@ -4625,6 +4438,80 @@
                 <a:srgbClr val="000000"/>
               </a:solidFill>
             </a:endParaRPr>
+          </a:p>
+        </p:txBody>
+      </p:sp>
+      <p:cxnSp>
+        <p:nvCxnSpPr>
+          <p:cNvPr id="94" name="Straight Connector 93"/>
+          <p:cNvCxnSpPr/>
+          <p:nvPr/>
+        </p:nvCxnSpPr>
+        <p:spPr>
+          <a:xfrm flipH="1">
+            <a:off x="6098315" y="3174666"/>
+            <a:ext cx="1" cy="657462"/>
+          </a:xfrm>
+          <a:prstGeom prst="line">
+            <a:avLst/>
+          </a:prstGeom>
+        </p:spPr>
+        <p:style>
+          <a:lnRef idx="2">
+            <a:schemeClr val="accent1"/>
+          </a:lnRef>
+          <a:fillRef idx="0">
+            <a:schemeClr val="accent1"/>
+          </a:fillRef>
+          <a:effectRef idx="1">
+            <a:schemeClr val="accent1"/>
+          </a:effectRef>
+          <a:fontRef idx="minor">
+            <a:schemeClr val="tx1"/>
+          </a:fontRef>
+        </p:style>
+      </p:cxnSp>
+      <p:sp>
+        <p:nvSpPr>
+          <p:cNvPr id="99" name="Rectangle 98"/>
+          <p:cNvSpPr/>
+          <p:nvPr/>
+        </p:nvSpPr>
+        <p:spPr>
+          <a:xfrm>
+            <a:off x="6090105" y="2611884"/>
+            <a:ext cx="2005826" cy="2022009"/>
+          </a:xfrm>
+          <a:prstGeom prst="rect">
+            <a:avLst/>
+          </a:prstGeom>
+          <a:noFill/>
+          <a:ln>
+            <a:solidFill>
+              <a:srgbClr val="FF0000"/>
+            </a:solidFill>
+          </a:ln>
+        </p:spPr>
+        <p:style>
+          <a:lnRef idx="1">
+            <a:schemeClr val="accent1"/>
+          </a:lnRef>
+          <a:fillRef idx="3">
+            <a:schemeClr val="accent1"/>
+          </a:fillRef>
+          <a:effectRef idx="2">
+            <a:schemeClr val="accent1"/>
+          </a:effectRef>
+          <a:fontRef idx="minor">
+            <a:schemeClr val="lt1"/>
+          </a:fontRef>
+        </p:style>
+        <p:txBody>
+          <a:bodyPr rtlCol="0" anchor="ctr"/>
+          <a:lstStyle/>
+          <a:p>
+            <a:pPr algn="ctr"/>
+            <a:endParaRPr lang="en-US"/>
           </a:p>
         </p:txBody>
       </p:sp>

</xml_diff>